<commit_message>
slides111w, staff note aded to CP_pigeonhole
</commit_message>
<xml_diff>
--- a/fall11/slidesF11/slides11w.pptx
+++ b/fall11/slidesF11/slides11w.pptx
@@ -5,33 +5,32 @@
     <p:sldMasterId id="2147483650" r:id="rId1"/>
   </p:sldMasterIdLst>
   <p:notesMasterIdLst>
-    <p:notesMasterId r:id="rId18"/>
+    <p:notesMasterId r:id="rId17"/>
   </p:notesMasterIdLst>
   <p:handoutMasterIdLst>
-    <p:handoutMasterId r:id="rId19"/>
+    <p:handoutMasterId r:id="rId18"/>
   </p:handoutMasterIdLst>
   <p:sldIdLst>
     <p:sldId id="524" r:id="rId2"/>
     <p:sldId id="525" r:id="rId3"/>
     <p:sldId id="538" r:id="rId4"/>
     <p:sldId id="526" r:id="rId5"/>
-    <p:sldId id="537" r:id="rId6"/>
-    <p:sldId id="528" r:id="rId7"/>
-    <p:sldId id="529" r:id="rId8"/>
-    <p:sldId id="536" r:id="rId9"/>
-    <p:sldId id="527" r:id="rId10"/>
-    <p:sldId id="530" r:id="rId11"/>
-    <p:sldId id="531" r:id="rId12"/>
-    <p:sldId id="532" r:id="rId13"/>
-    <p:sldId id="533" r:id="rId14"/>
-    <p:sldId id="534" r:id="rId15"/>
-    <p:sldId id="535" r:id="rId16"/>
-    <p:sldId id="437" r:id="rId17"/>
+    <p:sldId id="528" r:id="rId6"/>
+    <p:sldId id="529" r:id="rId7"/>
+    <p:sldId id="536" r:id="rId8"/>
+    <p:sldId id="527" r:id="rId9"/>
+    <p:sldId id="530" r:id="rId10"/>
+    <p:sldId id="531" r:id="rId11"/>
+    <p:sldId id="532" r:id="rId12"/>
+    <p:sldId id="533" r:id="rId13"/>
+    <p:sldId id="534" r:id="rId14"/>
+    <p:sldId id="535" r:id="rId15"/>
+    <p:sldId id="437" r:id="rId16"/>
   </p:sldIdLst>
   <p:sldSz cx="9144000" cy="6858000" type="screen4x3"/>
   <p:notesSz cx="7315200" cy="9601200"/>
   <p:custDataLst>
-    <p:tags r:id="rId21"/>
+    <p:tags r:id="rId20"/>
   </p:custDataLst>
   <p:defaultTextStyle>
     <a:defPPr>
@@ -959,7 +958,7 @@
           <a:bodyPr/>
           <a:lstStyle/>
           <a:p>
-            <a:fld id="{57DB25B3-9541-431B-AAF2-445E632C6F9E}" type="slidenum">
+            <a:fld id="{384F8CCC-91FE-409C-B929-439212CD1E34}" type="slidenum">
               <a:rPr lang="en-US"/>
               <a:pPr/>
               <a:t>10</a:t>
@@ -970,7 +969,7 @@
       </p:sp>
       <p:sp>
         <p:nvSpPr>
-          <p:cNvPr id="410626" name="Rectangle 2"/>
+          <p:cNvPr id="411650" name="Rectangle 2"/>
           <p:cNvSpPr>
             <a:spLocks noGrp="1" noRot="1" noChangeAspect="1" noChangeArrowheads="1" noTextEdit="1"/>
           </p:cNvSpPr>
@@ -984,7 +983,7 @@
       </p:sp>
       <p:sp>
         <p:nvSpPr>
-          <p:cNvPr id="410627" name="Rectangle 3"/>
+          <p:cNvPr id="411651" name="Rectangle 3"/>
           <p:cNvSpPr>
             <a:spLocks noGrp="1" noChangeArrowheads="1"/>
           </p:cNvSpPr>
@@ -1043,7 +1042,7 @@
           <a:bodyPr/>
           <a:lstStyle/>
           <a:p>
-            <a:fld id="{384F8CCC-91FE-409C-B929-439212CD1E34}" type="slidenum">
+            <a:fld id="{981861B7-D797-4E0E-A2B4-58A985E5EA23}" type="slidenum">
               <a:rPr lang="en-US"/>
               <a:pPr/>
               <a:t>11</a:t>
@@ -1054,7 +1053,7 @@
       </p:sp>
       <p:sp>
         <p:nvSpPr>
-          <p:cNvPr id="411650" name="Rectangle 2"/>
+          <p:cNvPr id="412674" name="Rectangle 2"/>
           <p:cNvSpPr>
             <a:spLocks noGrp="1" noRot="1" noChangeAspect="1" noChangeArrowheads="1" noTextEdit="1"/>
           </p:cNvSpPr>
@@ -1068,7 +1067,7 @@
       </p:sp>
       <p:sp>
         <p:nvSpPr>
-          <p:cNvPr id="411651" name="Rectangle 3"/>
+          <p:cNvPr id="412675" name="Rectangle 3"/>
           <p:cNvSpPr>
             <a:spLocks noGrp="1" noChangeArrowheads="1"/>
           </p:cNvSpPr>
@@ -1127,7 +1126,7 @@
           <a:bodyPr/>
           <a:lstStyle/>
           <a:p>
-            <a:fld id="{981861B7-D797-4E0E-A2B4-58A985E5EA23}" type="slidenum">
+            <a:fld id="{7A4244CD-1BD1-459D-8CE0-8EF58DD1AD27}" type="slidenum">
               <a:rPr lang="en-US"/>
               <a:pPr/>
               <a:t>12</a:t>
@@ -1138,7 +1137,7 @@
       </p:sp>
       <p:sp>
         <p:nvSpPr>
-          <p:cNvPr id="412674" name="Rectangle 2"/>
+          <p:cNvPr id="413698" name="Rectangle 2"/>
           <p:cNvSpPr>
             <a:spLocks noGrp="1" noRot="1" noChangeAspect="1" noChangeArrowheads="1" noTextEdit="1"/>
           </p:cNvSpPr>
@@ -1152,7 +1151,7 @@
       </p:sp>
       <p:sp>
         <p:nvSpPr>
-          <p:cNvPr id="412675" name="Rectangle 3"/>
+          <p:cNvPr id="413699" name="Rectangle 3"/>
           <p:cNvSpPr>
             <a:spLocks noGrp="1" noChangeArrowheads="1"/>
           </p:cNvSpPr>
@@ -1211,7 +1210,7 @@
           <a:bodyPr/>
           <a:lstStyle/>
           <a:p>
-            <a:fld id="{7A4244CD-1BD1-459D-8CE0-8EF58DD1AD27}" type="slidenum">
+            <a:fld id="{DF990428-D1E5-4BCF-96B1-6B7AF5DA08ED}" type="slidenum">
               <a:rPr lang="en-US"/>
               <a:pPr/>
               <a:t>13</a:t>
@@ -1222,7 +1221,7 @@
       </p:sp>
       <p:sp>
         <p:nvSpPr>
-          <p:cNvPr id="413698" name="Rectangle 2"/>
+          <p:cNvPr id="414722" name="Rectangle 2"/>
           <p:cNvSpPr>
             <a:spLocks noGrp="1" noRot="1" noChangeAspect="1" noChangeArrowheads="1" noTextEdit="1"/>
           </p:cNvSpPr>
@@ -1236,7 +1235,7 @@
       </p:sp>
       <p:sp>
         <p:nvSpPr>
-          <p:cNvPr id="413699" name="Rectangle 3"/>
+          <p:cNvPr id="414723" name="Rectangle 3"/>
           <p:cNvSpPr>
             <a:spLocks noGrp="1" noChangeArrowheads="1"/>
           </p:cNvSpPr>
@@ -1295,94 +1294,10 @@
           <a:bodyPr/>
           <a:lstStyle/>
           <a:p>
-            <a:fld id="{DF990428-D1E5-4BCF-96B1-6B7AF5DA08ED}" type="slidenum">
+            <a:fld id="{3F3054FE-070D-4E9A-966C-223CF8EAE0AB}" type="slidenum">
               <a:rPr lang="en-US"/>
               <a:pPr/>
               <a:t>14</a:t>
-            </a:fld>
-            <a:endParaRPr lang="en-US"/>
-          </a:p>
-        </p:txBody>
-      </p:sp>
-      <p:sp>
-        <p:nvSpPr>
-          <p:cNvPr id="414722" name="Rectangle 2"/>
-          <p:cNvSpPr>
-            <a:spLocks noGrp="1" noRot="1" noChangeAspect="1" noChangeArrowheads="1" noTextEdit="1"/>
-          </p:cNvSpPr>
-          <p:nvPr>
-            <p:ph type="sldImg"/>
-          </p:nvPr>
-        </p:nvSpPr>
-        <p:spPr>
-          <a:ln/>
-        </p:spPr>
-      </p:sp>
-      <p:sp>
-        <p:nvSpPr>
-          <p:cNvPr id="414723" name="Rectangle 3"/>
-          <p:cNvSpPr>
-            <a:spLocks noGrp="1" noChangeArrowheads="1"/>
-          </p:cNvSpPr>
-          <p:nvPr>
-            <p:ph type="body" idx="1"/>
-          </p:nvPr>
-        </p:nvSpPr>
-        <p:spPr/>
-        <p:txBody>
-          <a:bodyPr/>
-          <a:lstStyle/>
-          <a:p>
-            <a:endParaRPr lang="en-US"/>
-          </a:p>
-        </p:txBody>
-      </p:sp>
-    </p:spTree>
-  </p:cSld>
-  <p:clrMapOvr>
-    <a:masterClrMapping/>
-  </p:clrMapOvr>
-</p:notes>
-</file>
-
-<file path=ppt/notesSlides/notesSlide15.xml><?xml version="1.0" encoding="utf-8"?>
-<p:notes xmlns:a="http://schemas.openxmlformats.org/drawingml/2006/main" xmlns:r="http://schemas.openxmlformats.org/officeDocument/2006/relationships" xmlns:p="http://schemas.openxmlformats.org/presentationml/2006/main">
-  <p:cSld>
-    <p:spTree>
-      <p:nvGrpSpPr>
-        <p:cNvPr id="1" name=""/>
-        <p:cNvGrpSpPr/>
-        <p:nvPr/>
-      </p:nvGrpSpPr>
-      <p:grpSpPr>
-        <a:xfrm>
-          <a:off x="0" y="0"/>
-          <a:ext cx="0" cy="0"/>
-          <a:chOff x="0" y="0"/>
-          <a:chExt cx="0" cy="0"/>
-        </a:xfrm>
-      </p:grpSpPr>
-      <p:sp>
-        <p:nvSpPr>
-          <p:cNvPr id="7" name="Rectangle 7"/>
-          <p:cNvSpPr>
-            <a:spLocks noGrp="1" noChangeArrowheads="1"/>
-          </p:cNvSpPr>
-          <p:nvPr>
-            <p:ph type="sldNum" sz="quarter" idx="5"/>
-          </p:nvPr>
-        </p:nvSpPr>
-        <p:spPr>
-          <a:ln/>
-        </p:spPr>
-        <p:txBody>
-          <a:bodyPr/>
-          <a:lstStyle/>
-          <a:p>
-            <a:fld id="{3F3054FE-070D-4E9A-966C-223CF8EAE0AB}" type="slidenum">
-              <a:rPr lang="en-US"/>
-              <a:pPr/>
-              <a:t>15</a:t>
             </a:fld>
             <a:endParaRPr lang="en-US"/>
           </a:p>
@@ -1429,7 +1344,7 @@
 </p:notes>
 </file>
 
-<file path=ppt/notesSlides/notesSlide16.xml><?xml version="1.0" encoding="utf-8"?>
+<file path=ppt/notesSlides/notesSlide15.xml><?xml version="1.0" encoding="utf-8"?>
 <p:notes xmlns:a="http://schemas.openxmlformats.org/drawingml/2006/main" xmlns:r="http://schemas.openxmlformats.org/officeDocument/2006/relationships" xmlns:p="http://schemas.openxmlformats.org/presentationml/2006/main">
   <p:cSld>
     <p:spTree>
@@ -1466,7 +1381,7 @@
             <a:fld id="{DCFCCAF0-9330-4A97-B589-6DE83AD2FE71}" type="slidenum">
               <a:rPr lang="en-US" smtClean="0"/>
               <a:pPr/>
-              <a:t>16</a:t>
+              <a:t>15</a:t>
             </a:fld>
             <a:endParaRPr lang="en-US" smtClean="0"/>
           </a:p>
@@ -1797,21 +1712,49 @@
       </p:grpSpPr>
       <p:sp>
         <p:nvSpPr>
-          <p:cNvPr id="2" name="Slide Image Placeholder 1"/>
+          <p:cNvPr id="7" name="Rectangle 7"/>
           <p:cNvSpPr>
-            <a:spLocks noGrp="1" noRot="1" noChangeAspect="1"/>
+            <a:spLocks noGrp="1" noChangeArrowheads="1"/>
+          </p:cNvSpPr>
+          <p:nvPr>
+            <p:ph type="sldNum" sz="quarter" idx="5"/>
+          </p:nvPr>
+        </p:nvSpPr>
+        <p:spPr>
+          <a:ln/>
+        </p:spPr>
+        <p:txBody>
+          <a:bodyPr/>
+          <a:lstStyle/>
+          <a:p>
+            <a:fld id="{AC9BC9AC-6286-42AA-8147-F2962B8A2C09}" type="slidenum">
+              <a:rPr lang="en-US"/>
+              <a:pPr/>
+              <a:t>5</a:t>
+            </a:fld>
+            <a:endParaRPr lang="en-US"/>
+          </a:p>
+        </p:txBody>
+      </p:sp>
+      <p:sp>
+        <p:nvSpPr>
+          <p:cNvPr id="408578" name="Rectangle 2"/>
+          <p:cNvSpPr>
+            <a:spLocks noGrp="1" noRot="1" noChangeAspect="1" noChangeArrowheads="1" noTextEdit="1"/>
           </p:cNvSpPr>
           <p:nvPr>
             <p:ph type="sldImg"/>
           </p:nvPr>
         </p:nvSpPr>
-        <p:spPr/>
+        <p:spPr>
+          <a:ln/>
+        </p:spPr>
       </p:sp>
       <p:sp>
         <p:nvSpPr>
-          <p:cNvPr id="3" name="Notes Placeholder 2"/>
+          <p:cNvPr id="408579" name="Rectangle 3"/>
           <p:cNvSpPr>
-            <a:spLocks noGrp="1"/>
+            <a:spLocks noGrp="1" noChangeArrowheads="1"/>
           </p:cNvSpPr>
           <p:nvPr>
             <p:ph type="body" idx="1"/>
@@ -1819,40 +1762,9 @@
         </p:nvSpPr>
         <p:spPr/>
         <p:txBody>
-          <a:bodyPr>
-            <a:normAutofit/>
-          </a:bodyPr>
-          <a:lstStyle/>
-          <a:p>
-            <a:endParaRPr lang="en-US"/>
-          </a:p>
-        </p:txBody>
-      </p:sp>
-      <p:sp>
-        <p:nvSpPr>
-          <p:cNvPr id="4" name="Slide Number Placeholder 3"/>
-          <p:cNvSpPr>
-            <a:spLocks noGrp="1"/>
-          </p:cNvSpPr>
-          <p:nvPr>
-            <p:ph type="sldNum" sz="quarter" idx="10"/>
-          </p:nvPr>
-        </p:nvSpPr>
-        <p:spPr/>
-        <p:txBody>
           <a:bodyPr/>
           <a:lstStyle/>
           <a:p>
-            <a:pPr>
-              <a:defRPr/>
-            </a:pPr>
-            <a:fld id="{325DAB6F-2DE9-4287-AA6E-5530B3F58B2D}" type="slidenum">
-              <a:rPr lang="en-US" smtClean="0"/>
-              <a:pPr>
-                <a:defRPr/>
-              </a:pPr>
-              <a:t>5</a:t>
-            </a:fld>
             <a:endParaRPr lang="en-US"/>
           </a:p>
         </p:txBody>
@@ -1899,7 +1811,7 @@
           <a:bodyPr/>
           <a:lstStyle/>
           <a:p>
-            <a:fld id="{AC9BC9AC-6286-42AA-8147-F2962B8A2C09}" type="slidenum">
+            <a:fld id="{A53AD50B-FD20-4A78-B600-A577649DFECB}" type="slidenum">
               <a:rPr lang="en-US"/>
               <a:pPr/>
               <a:t>6</a:t>
@@ -1910,7 +1822,7 @@
       </p:sp>
       <p:sp>
         <p:nvSpPr>
-          <p:cNvPr id="408578" name="Rectangle 2"/>
+          <p:cNvPr id="409602" name="Rectangle 2"/>
           <p:cNvSpPr>
             <a:spLocks noGrp="1" noRot="1" noChangeAspect="1" noChangeArrowheads="1" noTextEdit="1"/>
           </p:cNvSpPr>
@@ -1924,7 +1836,7 @@
       </p:sp>
       <p:sp>
         <p:nvSpPr>
-          <p:cNvPr id="408579" name="Rectangle 3"/>
+          <p:cNvPr id="409603" name="Rectangle 3"/>
           <p:cNvSpPr>
             <a:spLocks noGrp="1" noChangeArrowheads="1"/>
           </p:cNvSpPr>
@@ -1983,7 +1895,7 @@
           <a:bodyPr/>
           <a:lstStyle/>
           <a:p>
-            <a:fld id="{A53AD50B-FD20-4A78-B600-A577649DFECB}" type="slidenum">
+            <a:fld id="{AF2AF15A-25DF-46C2-BE43-83B96B18396C}" type="slidenum">
               <a:rPr lang="en-US"/>
               <a:pPr/>
               <a:t>7</a:t>
@@ -1994,7 +1906,7 @@
       </p:sp>
       <p:sp>
         <p:nvSpPr>
-          <p:cNvPr id="409602" name="Rectangle 2"/>
+          <p:cNvPr id="407554" name="Rectangle 2"/>
           <p:cNvSpPr>
             <a:spLocks noGrp="1" noRot="1" noChangeAspect="1" noChangeArrowheads="1" noTextEdit="1"/>
           </p:cNvSpPr>
@@ -2008,7 +1920,7 @@
       </p:sp>
       <p:sp>
         <p:nvSpPr>
-          <p:cNvPr id="409603" name="Rectangle 3"/>
+          <p:cNvPr id="407555" name="Rectangle 3"/>
           <p:cNvSpPr>
             <a:spLocks noGrp="1" noChangeArrowheads="1"/>
           </p:cNvSpPr>
@@ -2151,7 +2063,7 @@
           <a:bodyPr/>
           <a:lstStyle/>
           <a:p>
-            <a:fld id="{AF2AF15A-25DF-46C2-BE43-83B96B18396C}" type="slidenum">
+            <a:fld id="{57DB25B3-9541-431B-AAF2-445E632C6F9E}" type="slidenum">
               <a:rPr lang="en-US"/>
               <a:pPr/>
               <a:t>9</a:t>
@@ -2162,7 +2074,7 @@
       </p:sp>
       <p:sp>
         <p:nvSpPr>
-          <p:cNvPr id="407554" name="Rectangle 2"/>
+          <p:cNvPr id="410626" name="Rectangle 2"/>
           <p:cNvSpPr>
             <a:spLocks noGrp="1" noRot="1" noChangeAspect="1" noChangeArrowheads="1" noTextEdit="1"/>
           </p:cNvSpPr>
@@ -2176,7 +2088,7 @@
       </p:sp>
       <p:sp>
         <p:nvSpPr>
-          <p:cNvPr id="407555" name="Rectangle 3"/>
+          <p:cNvPr id="410627" name="Rectangle 3"/>
           <p:cNvSpPr>
             <a:spLocks noGrp="1" noChangeArrowheads="1"/>
           </p:cNvSpPr>
@@ -2341,15 +2253,7 @@
             </a:r>
             <a:r>
               <a:rPr lang="en-US" dirty="0" smtClean="0"/>
-              <a:t> </a:t>
-            </a:r>
-            <a:r>
-              <a:rPr lang="en-US" dirty="0" smtClean="0"/>
-              <a:t>11W</a:t>
-            </a:r>
-            <a:r>
-              <a:rPr lang="en-US" dirty="0" smtClean="0"/>
-              <a:t>.</a:t>
+              <a:t> 11W.</a:t>
             </a:r>
             <a:fld id="{BCC17347-203B-4D69-97C4-A94B35CE4D6B}" type="slidenum">
               <a:rPr lang="en-US" smtClean="0"/>
@@ -2499,15 +2403,7 @@
             </a:r>
             <a:r>
               <a:rPr lang="en-US" dirty="0" smtClean="0"/>
-              <a:t> </a:t>
-            </a:r>
-            <a:r>
-              <a:rPr lang="en-US" dirty="0" smtClean="0"/>
-              <a:t>11W</a:t>
-            </a:r>
-            <a:r>
-              <a:rPr lang="en-US" dirty="0" smtClean="0"/>
-              <a:t>.</a:t>
+              <a:t> 11W.</a:t>
             </a:r>
             <a:fld id="{9B53EF5B-175E-4241-B670-7E35F50F0E84}" type="slidenum">
               <a:rPr lang="en-US" smtClean="0"/>
@@ -2609,15 +2505,7 @@
             </a:r>
             <a:r>
               <a:rPr lang="en-US" dirty="0" smtClean="0"/>
-              <a:t> </a:t>
-            </a:r>
-            <a:r>
-              <a:rPr lang="en-US" dirty="0" smtClean="0"/>
-              <a:t>11W</a:t>
-            </a:r>
-            <a:r>
-              <a:rPr lang="en-US" dirty="0" smtClean="0"/>
-              <a:t>.</a:t>
+              <a:t> 11W.</a:t>
             </a:r>
             <a:fld id="{9B53EF5B-175E-4241-B670-7E35F50F0E84}" type="slidenum">
               <a:rPr lang="en-US" smtClean="0"/>
@@ -2696,15 +2584,7 @@
             </a:r>
             <a:r>
               <a:rPr lang="en-US" dirty="0" smtClean="0"/>
-              <a:t> </a:t>
-            </a:r>
-            <a:r>
-              <a:rPr lang="en-US" dirty="0" smtClean="0"/>
-              <a:t>11W</a:t>
-            </a:r>
-            <a:r>
-              <a:rPr lang="en-US" dirty="0" smtClean="0"/>
-              <a:t>.</a:t>
+              <a:t> 11W.</a:t>
             </a:r>
             <a:fld id="{9B53EF5B-175E-4241-B670-7E35F50F0E84}" type="slidenum">
               <a:rPr lang="en-US" smtClean="0"/>
@@ -2952,15 +2832,7 @@
             </a:r>
             <a:r>
               <a:rPr lang="en-US" dirty="0" smtClean="0"/>
-              <a:t> </a:t>
-            </a:r>
-            <a:r>
-              <a:rPr lang="en-US" dirty="0" smtClean="0"/>
-              <a:t>11W</a:t>
-            </a:r>
-            <a:r>
-              <a:rPr lang="en-US" dirty="0" smtClean="0"/>
-              <a:t>.</a:t>
+              <a:t> 11W.</a:t>
             </a:r>
             <a:fld id="{F8B7C562-0F20-42BE-9A91-88D3363CA913}" type="slidenum">
               <a:rPr lang="en-US" smtClean="0"/>
@@ -3024,37 +2896,7 @@
                 <a:uFillTx/>
                 <a:latin typeface="Comic Sans MS" pitchFamily="66" charset="0"/>
               </a:rPr>
-              <a:t>Albert R Meyer,       </a:t>
-            </a:r>
-            <a:r>
-              <a:rPr kumimoji="0" lang="en-US" sz="1200" b="0" i="0" u="none" strike="noStrike" kern="1200" cap="none" spc="0" normalizeH="0" baseline="0" noProof="0" dirty="0" smtClean="0">
-                <a:ln>
-                  <a:noFill/>
-                </a:ln>
-                <a:solidFill>
-                  <a:schemeClr val="tx1"/>
-                </a:solidFill>
-                <a:effectLst/>
-                <a:uLnTx/>
-                <a:uFillTx/>
-                <a:latin typeface="Comic Sans MS" pitchFamily="66" charset="0"/>
-              </a:rPr>
-              <a:t>November 16, </a:t>
-            </a:r>
-            <a:r>
-              <a:rPr kumimoji="0" lang="en-US" sz="1200" b="0" i="0" u="none" strike="noStrike" kern="1200" cap="none" spc="0" normalizeH="0" baseline="0" noProof="0" dirty="0" smtClean="0">
-                <a:ln>
-                  <a:noFill/>
-                </a:ln>
-                <a:solidFill>
-                  <a:schemeClr val="tx1"/>
-                </a:solidFill>
-                <a:effectLst/>
-                <a:uLnTx/>
-                <a:uFillTx/>
-                <a:latin typeface="Comic Sans MS" pitchFamily="66" charset="0"/>
-              </a:rPr>
-              <a:t>2011</a:t>
+              <a:t>Albert R Meyer,       November 16, 2011</a:t>
             </a:r>
             <a:endParaRPr kumimoji="0" lang="en-US" sz="1200" b="0" i="0" u="none" strike="noStrike" kern="1200" cap="none" spc="0" normalizeH="0" baseline="0" noProof="0" dirty="0">
               <a:ln>
@@ -3612,11 +3454,7 @@
             </a:r>
             <a:r>
               <a:rPr lang="en-US" dirty="0" smtClean="0"/>
-              <a:t> </a:t>
-            </a:r>
-            <a:r>
-              <a:rPr lang="en-US" dirty="0" smtClean="0"/>
-              <a:t>11W.</a:t>
+              <a:t> 11W.</a:t>
             </a:r>
             <a:fld id="{67B4AFCC-5E15-4E97-9BE8-9E5193C2354C}" type="slidenum">
               <a:rPr lang="en-US" smtClean="0"/>
@@ -3708,339 +3546,6 @@
       </p:grpSpPr>
       <p:sp>
         <p:nvSpPr>
-          <p:cNvPr id="5" name="Slide Number Placeholder 3"/>
-          <p:cNvSpPr>
-            <a:spLocks noGrp="1"/>
-          </p:cNvSpPr>
-          <p:nvPr>
-            <p:ph type="sldNum" sz="quarter" idx="10"/>
-          </p:nvPr>
-        </p:nvSpPr>
-        <p:spPr/>
-        <p:txBody>
-          <a:bodyPr/>
-          <a:lstStyle/>
-          <a:p>
-            <a:r>
-              <a:rPr lang="en-US" dirty="0" err="1" smtClean="0"/>
-              <a:t>lec</a:t>
-            </a:r>
-            <a:r>
-              <a:rPr lang="en-US" dirty="0" smtClean="0"/>
-              <a:t> </a:t>
-            </a:r>
-            <a:r>
-              <a:rPr lang="en-US" dirty="0" smtClean="0"/>
-              <a:t>11W.</a:t>
-            </a:r>
-            <a:fld id="{FFB56D1A-619E-4CBF-8825-888C645FEF12}" type="slidenum">
-              <a:rPr lang="en-US" smtClean="0"/>
-              <a:pPr/>
-              <a:t>10</a:t>
-            </a:fld>
-            <a:endParaRPr lang="en-US" dirty="0"/>
-          </a:p>
-        </p:txBody>
-      </p:sp>
-      <p:sp>
-        <p:nvSpPr>
-          <p:cNvPr id="371714" name="Rectangle 2"/>
-          <p:cNvSpPr>
-            <a:spLocks noGrp="1" noChangeArrowheads="1"/>
-          </p:cNvSpPr>
-          <p:nvPr>
-            <p:ph type="title"/>
-          </p:nvPr>
-        </p:nvSpPr>
-        <p:spPr/>
-        <p:txBody>
-          <a:bodyPr/>
-          <a:lstStyle/>
-          <a:p>
-            <a:r>
-              <a:rPr lang="en-US" sz="4400" i="1" dirty="0" smtClean="0"/>
-              <a:t>example</a:t>
-            </a:r>
-            <a:r>
-              <a:rPr lang="en-US" sz="4400" i="1" dirty="0"/>
-              <a:t>: </a:t>
-            </a:r>
-            <a:r>
-              <a:rPr lang="en-US" sz="4800" dirty="0"/>
-              <a:t>5 Card Draw</a:t>
-            </a:r>
-          </a:p>
-        </p:txBody>
-      </p:sp>
-      <p:sp>
-        <p:nvSpPr>
-          <p:cNvPr id="371715" name="Rectangle 3"/>
-          <p:cNvSpPr>
-            <a:spLocks noGrp="1" noChangeArrowheads="1"/>
-          </p:cNvSpPr>
-          <p:nvPr>
-            <p:ph type="body" idx="1"/>
-          </p:nvPr>
-        </p:nvSpPr>
-        <p:spPr>
-          <a:xfrm>
-            <a:off x="393700" y="2209800"/>
-            <a:ext cx="7226300" cy="3352800"/>
-          </a:xfrm>
-        </p:spPr>
-        <p:txBody>
-          <a:bodyPr/>
-          <a:lstStyle/>
-          <a:p>
-            <a:pPr>
-              <a:buFontTx/>
-              <a:buNone/>
-            </a:pPr>
-            <a:r>
-              <a:rPr lang="en-US" sz="5400" dirty="0" smtClean="0"/>
-              <a:t>set </a:t>
-            </a:r>
-            <a:r>
-              <a:rPr lang="en-US" sz="5400" dirty="0"/>
-              <a:t>of 5 cards:</a:t>
-            </a:r>
-          </a:p>
-          <a:p>
-            <a:pPr>
-              <a:buFontTx/>
-              <a:buNone/>
-            </a:pPr>
-            <a:r>
-              <a:rPr lang="en-US" sz="5400" dirty="0"/>
-              <a:t>must have</a:t>
-            </a:r>
-            <a:r>
-              <a:rPr lang="en-US" sz="5400" dirty="0" smtClean="0"/>
-              <a:t> </a:t>
-            </a:r>
-            <a:r>
-              <a:rPr lang="en-US" sz="5400" b="1" dirty="0" smtClean="0">
-                <a:solidFill>
-                  <a:srgbClr val="008000"/>
-                </a:solidFill>
-                <a:latin typeface="Euclid Symbol" charset="2"/>
-                <a:cs typeface="Euclid Symbol" charset="2"/>
-                <a:sym typeface="Symbol"/>
-              </a:rPr>
-              <a:t>≥</a:t>
-            </a:r>
-            <a:r>
-              <a:rPr lang="en-US" sz="5400" b="1" dirty="0" smtClean="0">
-                <a:solidFill>
-                  <a:srgbClr val="00B050"/>
-                </a:solidFill>
-                <a:latin typeface="cmsy10" pitchFamily="34" charset="0"/>
-                <a:sym typeface="Symbol"/>
-              </a:rPr>
-              <a:t> </a:t>
-            </a:r>
-            <a:r>
-              <a:rPr lang="en-US" sz="5400" dirty="0" smtClean="0">
-                <a:solidFill>
-                  <a:srgbClr val="00B050"/>
-                </a:solidFill>
-              </a:rPr>
-              <a:t>2</a:t>
-            </a:r>
-            <a:endParaRPr lang="en-US" sz="5400" dirty="0">
-              <a:solidFill>
-                <a:srgbClr val="00B050"/>
-              </a:solidFill>
-            </a:endParaRPr>
-          </a:p>
-          <a:p>
-            <a:pPr>
-              <a:buFontTx/>
-              <a:buNone/>
-            </a:pPr>
-            <a:r>
-              <a:rPr lang="en-US" sz="5400" dirty="0"/>
-              <a:t>with the </a:t>
-            </a:r>
-            <a:r>
-              <a:rPr lang="en-US" sz="6000" dirty="0">
-                <a:solidFill>
-                  <a:srgbClr val="3333CC"/>
-                </a:solidFill>
-              </a:rPr>
-              <a:t>same suit</a:t>
-            </a:r>
-            <a:r>
-              <a:rPr lang="en-US" sz="6000" dirty="0"/>
-              <a:t>.</a:t>
-            </a:r>
-          </a:p>
-        </p:txBody>
-      </p:sp>
-      <p:pic>
-        <p:nvPicPr>
-          <p:cNvPr id="371716" name="Picture 4" descr="sl12212"/>
-          <p:cNvPicPr>
-            <a:picLocks noChangeAspect="1" noChangeArrowheads="1"/>
-          </p:cNvPicPr>
-          <p:nvPr/>
-        </p:nvPicPr>
-        <p:blipFill>
-          <a:blip r:embed="rId3"/>
-          <a:srcRect/>
-          <a:stretch>
-            <a:fillRect/>
-          </a:stretch>
-        </p:blipFill>
-        <p:spPr bwMode="auto">
-          <a:xfrm>
-            <a:off x="6559550" y="1447800"/>
-            <a:ext cx="2136775" cy="2709863"/>
-          </a:xfrm>
-          <a:prstGeom prst="rect">
-            <a:avLst/>
-          </a:prstGeom>
-          <a:noFill/>
-        </p:spPr>
-      </p:pic>
-    </p:spTree>
-  </p:cSld>
-  <p:clrMapOvr>
-    <a:masterClrMapping/>
-  </p:clrMapOvr>
-  <p:transition xmlns:p14="http://schemas.microsoft.com/office/powerpoint/2010/main"/>
-  <p:timing>
-    <p:tnLst>
-      <p:par>
-        <p:cTn xmlns:p14="http://schemas.microsoft.com/office/powerpoint/2010/main" id="1" dur="indefinite" restart="never" nodeType="tmRoot">
-          <p:childTnLst>
-            <p:seq concurrent="1" nextAc="seek">
-              <p:cTn id="2" dur="indefinite" nodeType="mainSeq">
-                <p:childTnLst>
-                  <p:par>
-                    <p:cTn id="3" fill="hold">
-                      <p:stCondLst>
-                        <p:cond delay="indefinite"/>
-                      </p:stCondLst>
-                      <p:childTnLst>
-                        <p:par>
-                          <p:cTn id="4" fill="hold">
-                            <p:stCondLst>
-                              <p:cond delay="0"/>
-                            </p:stCondLst>
-                            <p:childTnLst>
-                              <p:par>
-                                <p:cTn id="5" presetID="1" presetClass="entr" presetSubtype="0" fill="hold" nodeType="clickEffect">
-                                  <p:stCondLst>
-                                    <p:cond delay="0"/>
-                                  </p:stCondLst>
-                                  <p:childTnLst>
-                                    <p:set>
-                                      <p:cBhvr>
-                                        <p:cTn id="6" dur="1" fill="hold">
-                                          <p:stCondLst>
-                                            <p:cond delay="0"/>
-                                          </p:stCondLst>
-                                        </p:cTn>
-                                        <p:tgtEl>
-                                          <p:spTgt spid="371715">
-                                            <p:txEl>
-                                              <p:pRg st="1" end="1"/>
-                                            </p:txEl>
-                                          </p:spTgt>
-                                        </p:tgtEl>
-                                        <p:attrNameLst>
-                                          <p:attrName>style.visibility</p:attrName>
-                                        </p:attrNameLst>
-                                      </p:cBhvr>
-                                      <p:to>
-                                        <p:strVal val="visible"/>
-                                      </p:to>
-                                    </p:set>
-                                  </p:childTnLst>
-                                </p:cTn>
-                              </p:par>
-                              <p:par>
-                                <p:cTn id="7" presetID="1" presetClass="entr" presetSubtype="0" fill="hold" nodeType="withEffect">
-                                  <p:stCondLst>
-                                    <p:cond delay="0"/>
-                                  </p:stCondLst>
-                                  <p:childTnLst>
-                                    <p:set>
-                                      <p:cBhvr>
-                                        <p:cTn id="8" dur="1" fill="hold">
-                                          <p:stCondLst>
-                                            <p:cond delay="0"/>
-                                          </p:stCondLst>
-                                        </p:cTn>
-                                        <p:tgtEl>
-                                          <p:spTgt spid="371715">
-                                            <p:txEl>
-                                              <p:pRg st="2" end="2"/>
-                                            </p:txEl>
-                                          </p:spTgt>
-                                        </p:tgtEl>
-                                        <p:attrNameLst>
-                                          <p:attrName>style.visibility</p:attrName>
-                                        </p:attrNameLst>
-                                      </p:cBhvr>
-                                      <p:to>
-                                        <p:strVal val="visible"/>
-                                      </p:to>
-                                    </p:set>
-                                  </p:childTnLst>
-                                </p:cTn>
-                              </p:par>
-                            </p:childTnLst>
-                          </p:cTn>
-                        </p:par>
-                      </p:childTnLst>
-                    </p:cTn>
-                  </p:par>
-                </p:childTnLst>
-              </p:cTn>
-              <p:prevCondLst>
-                <p:cond evt="onPrev" delay="0">
-                  <p:tgtEl>
-                    <p:sldTgt/>
-                  </p:tgtEl>
-                </p:cond>
-              </p:prevCondLst>
-              <p:nextCondLst>
-                <p:cond evt="onNext" delay="0">
-                  <p:tgtEl>
-                    <p:sldTgt/>
-                  </p:tgtEl>
-                </p:cond>
-              </p:nextCondLst>
-            </p:seq>
-          </p:childTnLst>
-        </p:cTn>
-      </p:par>
-    </p:tnLst>
-  </p:timing>
-</p:sld>
-</file>
-
-<file path=ppt/slides/slide11.xml><?xml version="1.0" encoding="utf-8"?>
-<p:sld xmlns:a="http://schemas.openxmlformats.org/drawingml/2006/main" xmlns:r="http://schemas.openxmlformats.org/officeDocument/2006/relationships" xmlns:p="http://schemas.openxmlformats.org/presentationml/2006/main">
-  <p:cSld>
-    <p:spTree>
-      <p:nvGrpSpPr>
-        <p:cNvPr id="1" name=""/>
-        <p:cNvGrpSpPr/>
-        <p:nvPr/>
-      </p:nvGrpSpPr>
-      <p:grpSpPr>
-        <a:xfrm>
-          <a:off x="0" y="0"/>
-          <a:ext cx="0" cy="0"/>
-          <a:chOff x="0" y="0"/>
-          <a:chExt cx="0" cy="0"/>
-        </a:xfrm>
-      </p:grpSpPr>
-      <p:sp>
-        <p:nvSpPr>
           <p:cNvPr id="34" name="Slide Number Placeholder 2"/>
           <p:cNvSpPr>
             <a:spLocks noGrp="1"/>
@@ -4060,16 +3565,12 @@
             </a:r>
             <a:r>
               <a:rPr lang="en-US" dirty="0" smtClean="0"/>
-              <a:t> </a:t>
-            </a:r>
-            <a:r>
-              <a:rPr lang="en-US" dirty="0" smtClean="0"/>
-              <a:t>11W.</a:t>
+              <a:t> 11W.</a:t>
             </a:r>
             <a:fld id="{26C4B2EC-EBDF-4F84-A6B8-96296CC9F715}" type="slidenum">
               <a:rPr lang="en-US" smtClean="0"/>
               <a:pPr/>
-              <a:t>11</a:t>
+              <a:t>10</a:t>
             </a:fld>
             <a:endParaRPr lang="en-US" dirty="0"/>
           </a:p>
@@ -5269,7 +4770,7 @@
 </p:sld>
 </file>
 
-<file path=ppt/slides/slide12.xml><?xml version="1.0" encoding="utf-8"?>
+<file path=ppt/slides/slide11.xml><?xml version="1.0" encoding="utf-8"?>
 <p:sld xmlns:a="http://schemas.openxmlformats.org/drawingml/2006/main" xmlns:r="http://schemas.openxmlformats.org/officeDocument/2006/relationships" xmlns:p="http://schemas.openxmlformats.org/presentationml/2006/main">
   <p:cSld>
     <p:spTree>
@@ -5307,16 +4808,12 @@
             </a:r>
             <a:r>
               <a:rPr lang="en-US" dirty="0" smtClean="0"/>
-              <a:t> </a:t>
-            </a:r>
-            <a:r>
-              <a:rPr lang="en-US" dirty="0" smtClean="0"/>
-              <a:t>11W.</a:t>
+              <a:t> 11W.</a:t>
             </a:r>
             <a:fld id="{2047D62D-029E-4D15-8766-64706C394813}" type="slidenum">
               <a:rPr lang="en-US" smtClean="0"/>
               <a:pPr/>
-              <a:t>12</a:t>
+              <a:t>11</a:t>
             </a:fld>
             <a:endParaRPr lang="en-US" dirty="0"/>
           </a:p>
@@ -5417,7 +4914,7 @@
 </p:sld>
 </file>
 
-<file path=ppt/slides/slide13.xml><?xml version="1.0" encoding="utf-8"?>
+<file path=ppt/slides/slide12.xml><?xml version="1.0" encoding="utf-8"?>
 <p:sld xmlns:a="http://schemas.openxmlformats.org/drawingml/2006/main" xmlns:r="http://schemas.openxmlformats.org/officeDocument/2006/relationships" xmlns:p="http://schemas.openxmlformats.org/presentationml/2006/main">
   <p:cSld>
     <p:spTree>
@@ -5561,16 +5058,12 @@
             </a:r>
             <a:r>
               <a:rPr lang="en-US" dirty="0" smtClean="0"/>
-              <a:t> </a:t>
-            </a:r>
-            <a:r>
-              <a:rPr lang="en-US" dirty="0" smtClean="0"/>
-              <a:t>11W.</a:t>
+              <a:t> 11W.</a:t>
             </a:r>
             <a:fld id="{5CD33F37-20A9-45F8-AF45-45B40495E381}" type="slidenum">
               <a:rPr lang="en-US" smtClean="0"/>
               <a:pPr/>
-              <a:t>13</a:t>
+              <a:t>12</a:t>
             </a:fld>
             <a:endParaRPr lang="en-US" dirty="0"/>
           </a:p>
@@ -6937,7 +6430,7 @@
 </p:sld>
 </file>
 
-<file path=ppt/slides/slide14.xml><?xml version="1.0" encoding="utf-8"?>
+<file path=ppt/slides/slide13.xml><?xml version="1.0" encoding="utf-8"?>
 <p:sld xmlns:a="http://schemas.openxmlformats.org/drawingml/2006/main" xmlns:r="http://schemas.openxmlformats.org/officeDocument/2006/relationships" xmlns:p="http://schemas.openxmlformats.org/presentationml/2006/main">
   <p:cSld>
     <p:spTree>
@@ -6975,16 +6468,12 @@
             </a:r>
             <a:r>
               <a:rPr lang="en-US" dirty="0" smtClean="0"/>
-              <a:t> </a:t>
-            </a:r>
-            <a:r>
-              <a:rPr lang="en-US" dirty="0" smtClean="0"/>
-              <a:t>11W.</a:t>
+              <a:t> 11W.</a:t>
             </a:r>
             <a:fld id="{D3E316F6-DF61-4693-B623-52B972212521}" type="slidenum">
               <a:rPr lang="en-US" smtClean="0"/>
               <a:pPr/>
-              <a:t>14</a:t>
+              <a:t>13</a:t>
             </a:fld>
             <a:endParaRPr lang="en-US" dirty="0"/>
           </a:p>
@@ -7077,7 +6566,7 @@
           <a:graphicData uri="http://schemas.openxmlformats.org/presentationml/2006/ole">
             <mc:AlternateContent xmlns:mc="http://schemas.openxmlformats.org/markup-compatibility/2006">
               <mc:Choice xmlns:v="urn:schemas-microsoft-com:vml" Requires="v">
-                <p:oleObj spid="_x0000_s115716" name="Equation" r:id="rId4" imgW="711200" imgH="482600" progId="Equation.DSMT4">
+                <p:oleObj spid="_x0000_s115718" name="Equation" r:id="rId4" imgW="711200" imgH="482600" progId="Equation.DSMT4">
                   <p:embed/>
                 </p:oleObj>
               </mc:Choice>
@@ -7438,7 +6927,7 @@
 </p:sld>
 </file>
 
-<file path=ppt/slides/slide15.xml><?xml version="1.0" encoding="utf-8"?>
+<file path=ppt/slides/slide14.xml><?xml version="1.0" encoding="utf-8"?>
 <p:sld xmlns:a="http://schemas.openxmlformats.org/drawingml/2006/main" xmlns:r="http://schemas.openxmlformats.org/officeDocument/2006/relationships" xmlns:p="http://schemas.openxmlformats.org/presentationml/2006/main">
   <p:cSld>
     <p:spTree>
@@ -7476,16 +6965,12 @@
             </a:r>
             <a:r>
               <a:rPr lang="en-US" dirty="0" smtClean="0"/>
-              <a:t> </a:t>
-            </a:r>
-            <a:r>
-              <a:rPr lang="en-US" dirty="0" smtClean="0"/>
-              <a:t>11W.</a:t>
+              <a:t> 11W.</a:t>
             </a:r>
             <a:fld id="{72CAA7DA-673E-4241-A128-598225151065}" type="slidenum">
               <a:rPr lang="en-US" smtClean="0"/>
               <a:pPr/>
-              <a:t>15</a:t>
+              <a:t>14</a:t>
             </a:fld>
             <a:endParaRPr lang="en-US" dirty="0"/>
           </a:p>
@@ -7615,7 +7100,7 @@
           <a:graphicData uri="http://schemas.openxmlformats.org/presentationml/2006/ole">
             <mc:AlternateContent xmlns:mc="http://schemas.openxmlformats.org/markup-compatibility/2006">
               <mc:Choice xmlns:v="urn:schemas-microsoft-com:vml" Requires="v">
-                <p:oleObj spid="_x0000_s117764" name="Equation" r:id="rId4" imgW="291960" imgH="431640" progId="Equation.DSMT4">
+                <p:oleObj spid="_x0000_s117766" name="Equation" r:id="rId4" imgW="291960" imgH="431640" progId="Equation.DSMT4">
                   <p:embed/>
                 </p:oleObj>
               </mc:Choice>
@@ -7839,7 +7324,7 @@
 </p:sld>
 </file>
 
-<file path=ppt/slides/slide16.xml><?xml version="1.0" encoding="utf-8"?>
+<file path=ppt/slides/slide15.xml><?xml version="1.0" encoding="utf-8"?>
 <p:sld xmlns:a="http://schemas.openxmlformats.org/drawingml/2006/main" xmlns:r="http://schemas.openxmlformats.org/officeDocument/2006/relationships" xmlns:p="http://schemas.openxmlformats.org/presentationml/2006/main">
   <p:cSld>
     <p:spTree>
@@ -7984,16 +7469,12 @@
             </a:r>
             <a:r>
               <a:rPr lang="en-US" dirty="0" smtClean="0"/>
-              <a:t> </a:t>
-            </a:r>
-            <a:r>
-              <a:rPr lang="en-US" dirty="0" smtClean="0"/>
-              <a:t>11W.</a:t>
+              <a:t> 11W.</a:t>
             </a:r>
             <a:fld id="{892461E5-9574-4DF1-B63F-666E7D58F4AD}" type="slidenum">
               <a:rPr lang="en-US" smtClean="0"/>
               <a:pPr/>
-              <a:t>16</a:t>
+              <a:t>15</a:t>
             </a:fld>
             <a:endParaRPr lang="en-US" dirty="0" smtClean="0"/>
           </a:p>
@@ -8851,11 +8332,7 @@
             </a:r>
             <a:r>
               <a:rPr lang="en-US" dirty="0" smtClean="0"/>
-              <a:t> </a:t>
-            </a:r>
-            <a:r>
-              <a:rPr lang="en-US" dirty="0" smtClean="0"/>
-              <a:t>11W.</a:t>
+              <a:t> 11W.</a:t>
             </a:r>
             <a:fld id="{2B54D3A3-7076-4E41-BC8B-85C6A2A80614}" type="slidenum">
               <a:rPr lang="en-US" smtClean="0"/>
@@ -8884,7 +8361,7 @@
           <a:graphicData uri="http://schemas.openxmlformats.org/presentationml/2006/ole">
             <mc:AlternateContent xmlns:mc="http://schemas.openxmlformats.org/markup-compatibility/2006">
               <mc:Choice xmlns:v="urn:schemas-microsoft-com:vml" Requires="v">
-                <p:oleObj spid="_x0000_s54276" name="Equation" r:id="rId4" imgW="495300" imgH="482600" progId="Equation.DSMT4">
+                <p:oleObj spid="_x0000_s54278" name="Equation" r:id="rId4" imgW="495300" imgH="482600" progId="Equation.DSMT4">
                   <p:embed/>
                 </p:oleObj>
               </mc:Choice>
@@ -9964,11 +9441,7 @@
             </a:r>
             <a:r>
               <a:rPr lang="en-US" dirty="0" smtClean="0"/>
-              <a:t> </a:t>
-            </a:r>
-            <a:r>
-              <a:rPr lang="en-US" dirty="0" smtClean="0"/>
-              <a:t>11W.</a:t>
+              <a:t> 11W.</a:t>
             </a:r>
             <a:fld id="{2B54D3A3-7076-4E41-BC8B-85C6A2A80614}" type="slidenum">
               <a:rPr lang="en-US" smtClean="0"/>
@@ -10025,7 +9498,7 @@
           <a:graphicData uri="http://schemas.openxmlformats.org/presentationml/2006/ole">
             <mc:AlternateContent xmlns:mc="http://schemas.openxmlformats.org/markup-compatibility/2006">
               <mc:Choice xmlns:v="urn:schemas-microsoft-com:vml" Requires="v">
-                <p:oleObj spid="_x0000_s125956" name="Equation" r:id="rId4" imgW="495300" imgH="482600" progId="Equation.DSMT4">
+                <p:oleObj spid="_x0000_s125958" name="Equation" r:id="rId4" imgW="495300" imgH="482600" progId="Equation.DSMT4">
                   <p:embed/>
                 </p:oleObj>
               </mc:Choice>
@@ -10869,11 +10342,7 @@
             </a:r>
             <a:r>
               <a:rPr lang="en-US" dirty="0" smtClean="0"/>
-              <a:t> </a:t>
-            </a:r>
-            <a:r>
-              <a:rPr lang="en-US" dirty="0" smtClean="0"/>
-              <a:t>11W.</a:t>
+              <a:t> 11W.</a:t>
             </a:r>
             <a:fld id="{2B54D3A3-7076-4E41-BC8B-85C6A2A80614}" type="slidenum">
               <a:rPr lang="en-US" smtClean="0"/>
@@ -10908,7 +10377,7 @@
           <a:graphicData uri="http://schemas.openxmlformats.org/presentationml/2006/ole">
             <mc:AlternateContent xmlns:mc="http://schemas.openxmlformats.org/markup-compatibility/2006">
               <mc:Choice xmlns:v="urn:schemas-microsoft-com:vml" Requires="v">
-                <p:oleObj spid="_x0000_s56325" name="Equation" r:id="rId4" imgW="723900" imgH="533400" progId="Equation.3">
+                <p:oleObj spid="_x0000_s56328" name="Equation" r:id="rId4" imgW="723900" imgH="533400" progId="Equation.3">
                   <p:embed/>
                 </p:oleObj>
               </mc:Choice>
@@ -10978,7 +10447,7 @@
           <a:graphicData uri="http://schemas.openxmlformats.org/presentationml/2006/ole">
             <mc:AlternateContent xmlns:mc="http://schemas.openxmlformats.org/markup-compatibility/2006">
               <mc:Choice xmlns:v="urn:schemas-microsoft-com:vml" Requires="v">
-                <p:oleObj spid="_x0000_s56326" name="Equation" r:id="rId6" imgW="1130300" imgH="558800" progId="Equation.3">
+                <p:oleObj spid="_x0000_s56329" name="Equation" r:id="rId6" imgW="1130300" imgH="558800" progId="Equation.3">
                   <p:embed/>
                 </p:oleObj>
               </mc:Choice>
@@ -11447,790 +10916,6 @@
 </file>
 
 <file path=ppt/slides/slide5.xml><?xml version="1.0" encoding="utf-8"?>
-<p:sld xmlns:a="http://schemas.openxmlformats.org/drawingml/2006/main" xmlns:r="http://schemas.openxmlformats.org/officeDocument/2006/relationships" xmlns:p="http://schemas.openxmlformats.org/presentationml/2006/main" show="0">
-  <p:cSld>
-    <p:spTree>
-      <p:nvGrpSpPr>
-        <p:cNvPr id="1" name=""/>
-        <p:cNvGrpSpPr/>
-        <p:nvPr/>
-      </p:nvGrpSpPr>
-      <p:grpSpPr>
-        <a:xfrm>
-          <a:off x="0" y="0"/>
-          <a:ext cx="0" cy="0"/>
-          <a:chOff x="0" y="0"/>
-          <a:chExt cx="0" cy="0"/>
-        </a:xfrm>
-      </p:grpSpPr>
-      <p:sp>
-        <p:nvSpPr>
-          <p:cNvPr id="4" name="Content Placeholder 3"/>
-          <p:cNvSpPr>
-            <a:spLocks noGrp="1"/>
-          </p:cNvSpPr>
-          <p:nvPr>
-            <p:ph idx="1"/>
-          </p:nvPr>
-        </p:nvSpPr>
-        <p:spPr>
-          <a:xfrm>
-            <a:off x="381000" y="1143000"/>
-            <a:ext cx="8382000" cy="2057400"/>
-          </a:xfrm>
-        </p:spPr>
-        <p:txBody>
-          <a:bodyPr/>
-          <a:lstStyle/>
-          <a:p>
-            <a:r>
-              <a:rPr lang="en-US" sz="4400" dirty="0" smtClean="0"/>
-              <a:t># permutations of a word with</a:t>
-            </a:r>
-          </a:p>
-          <a:p>
-            <a:r>
-              <a:rPr lang="en-US" sz="4400" dirty="0" smtClean="0">
-                <a:solidFill>
-                  <a:schemeClr val="accent1">
-                    <a:lumMod val="50000"/>
-                  </a:schemeClr>
-                </a:solidFill>
-              </a:rPr>
-              <a:t>n</a:t>
-            </a:r>
-            <a:r>
-              <a:rPr lang="en-US" sz="4400" baseline="-25000" dirty="0" smtClean="0">
-                <a:solidFill>
-                  <a:schemeClr val="accent1">
-                    <a:lumMod val="50000"/>
-                  </a:schemeClr>
-                </a:solidFill>
-              </a:rPr>
-              <a:t>1</a:t>
-            </a:r>
-            <a:r>
-              <a:rPr lang="en-US" sz="4400" dirty="0" smtClean="0"/>
-              <a:t> </a:t>
-            </a:r>
-            <a:r>
-              <a:rPr lang="en-US" sz="4400" b="1" dirty="0" err="1" smtClean="0"/>
-              <a:t>a</a:t>
-            </a:r>
-            <a:r>
-              <a:rPr lang="en-US" sz="4400" dirty="0" err="1" smtClean="0"/>
-              <a:t>’s</a:t>
-            </a:r>
-            <a:r>
-              <a:rPr lang="en-US" sz="4400" dirty="0" smtClean="0"/>
-              <a:t>, </a:t>
-            </a:r>
-            <a:r>
-              <a:rPr lang="en-US" sz="4400" dirty="0" smtClean="0">
-                <a:solidFill>
-                  <a:schemeClr val="accent1">
-                    <a:lumMod val="50000"/>
-                  </a:schemeClr>
-                </a:solidFill>
-              </a:rPr>
-              <a:t>n</a:t>
-            </a:r>
-            <a:r>
-              <a:rPr lang="en-US" sz="4400" baseline="-25000" dirty="0" smtClean="0">
-                <a:solidFill>
-                  <a:schemeClr val="accent1">
-                    <a:lumMod val="50000"/>
-                  </a:schemeClr>
-                </a:solidFill>
-              </a:rPr>
-              <a:t>2</a:t>
-            </a:r>
-            <a:r>
-              <a:rPr lang="en-US" sz="4400" dirty="0" smtClean="0"/>
-              <a:t> </a:t>
-            </a:r>
-            <a:r>
-              <a:rPr lang="en-US" sz="4400" b="1" dirty="0" err="1" smtClean="0"/>
-              <a:t>b</a:t>
-            </a:r>
-            <a:r>
-              <a:rPr lang="en-US" sz="4400" dirty="0" err="1" smtClean="0"/>
-              <a:t>’s</a:t>
-            </a:r>
-            <a:r>
-              <a:rPr lang="en-US" sz="4400" dirty="0" smtClean="0"/>
-              <a:t>, …, </a:t>
-            </a:r>
-            <a:r>
-              <a:rPr lang="en-US" sz="4400" dirty="0" err="1" smtClean="0">
-                <a:solidFill>
-                  <a:schemeClr val="accent1">
-                    <a:lumMod val="50000"/>
-                  </a:schemeClr>
-                </a:solidFill>
-              </a:rPr>
-              <a:t>n</a:t>
-            </a:r>
-            <a:r>
-              <a:rPr lang="en-US" sz="4400" baseline="-25000" dirty="0" err="1" smtClean="0">
-                <a:solidFill>
-                  <a:schemeClr val="accent1">
-                    <a:lumMod val="50000"/>
-                  </a:schemeClr>
-                </a:solidFill>
-              </a:rPr>
-              <a:t>k</a:t>
-            </a:r>
-            <a:r>
-              <a:rPr lang="en-US" sz="4400" dirty="0" smtClean="0"/>
-              <a:t> </a:t>
-            </a:r>
-            <a:r>
-              <a:rPr lang="en-US" sz="4400" b="1" dirty="0" err="1" smtClean="0"/>
-              <a:t>z</a:t>
-            </a:r>
-            <a:r>
-              <a:rPr lang="en-US" sz="4400" dirty="0" err="1" smtClean="0"/>
-              <a:t>’s</a:t>
-            </a:r>
-            <a:r>
-              <a:rPr lang="en-US" sz="4400" dirty="0" smtClean="0"/>
-              <a:t> is</a:t>
-            </a:r>
-            <a:endParaRPr lang="en-US" dirty="0" smtClean="0"/>
-          </a:p>
-        </p:txBody>
-      </p:sp>
-      <p:sp>
-        <p:nvSpPr>
-          <p:cNvPr id="2" name="Title 1"/>
-          <p:cNvSpPr>
-            <a:spLocks noGrp="1"/>
-          </p:cNvSpPr>
-          <p:nvPr>
-            <p:ph type="title"/>
-          </p:nvPr>
-        </p:nvSpPr>
-        <p:spPr>
-          <a:xfrm>
-            <a:off x="1905000" y="228600"/>
-            <a:ext cx="6629400" cy="1143000"/>
-          </a:xfrm>
-        </p:spPr>
-        <p:txBody>
-          <a:bodyPr/>
-          <a:lstStyle/>
-          <a:p>
-            <a:r>
-              <a:rPr lang="en-US" dirty="0" smtClean="0"/>
-              <a:t>bookkeeper rule</a:t>
-            </a:r>
-            <a:endParaRPr lang="en-US" dirty="0"/>
-          </a:p>
-        </p:txBody>
-      </p:sp>
-      <p:sp>
-        <p:nvSpPr>
-          <p:cNvPr id="3" name="Slide Number Placeholder 2"/>
-          <p:cNvSpPr>
-            <a:spLocks noGrp="1"/>
-          </p:cNvSpPr>
-          <p:nvPr>
-            <p:ph type="sldNum" sz="quarter" idx="10"/>
-          </p:nvPr>
-        </p:nvSpPr>
-        <p:spPr/>
-        <p:txBody>
-          <a:bodyPr/>
-          <a:lstStyle/>
-          <a:p>
-            <a:pPr>
-              <a:defRPr/>
-            </a:pPr>
-            <a:r>
-              <a:rPr lang="en-US" dirty="0" err="1" smtClean="0"/>
-              <a:t>lec</a:t>
-            </a:r>
-            <a:r>
-              <a:rPr lang="en-US" dirty="0" smtClean="0"/>
-              <a:t> </a:t>
-            </a:r>
-            <a:r>
-              <a:rPr lang="en-US" dirty="0" smtClean="0"/>
-              <a:t>11W.</a:t>
-            </a:r>
-            <a:fld id="{2B54D3A3-7076-4E41-BC8B-85C6A2A80614}" type="slidenum">
-              <a:rPr lang="en-US" smtClean="0"/>
-              <a:pPr>
-                <a:defRPr/>
-              </a:pPr>
-              <a:t>5</a:t>
-            </a:fld>
-            <a:endParaRPr lang="en-US" dirty="0"/>
-          </a:p>
-        </p:txBody>
-      </p:sp>
-      <p:graphicFrame>
-        <p:nvGraphicFramePr>
-          <p:cNvPr id="7" name="Object 6"/>
-          <p:cNvGraphicFramePr>
-            <a:graphicFrameLocks noChangeAspect="1"/>
-          </p:cNvGraphicFramePr>
-          <p:nvPr>
-            <p:extLst>
-              <p:ext uri="{D42A27DB-BD31-4B8C-83A1-F6EECF244321}">
-                <p14:modId xmlns:p14="http://schemas.microsoft.com/office/powerpoint/2010/main" val="1543611712"/>
-              </p:ext>
-            </p:extLst>
-          </p:nvPr>
-        </p:nvGraphicFramePr>
-        <p:xfrm>
-          <a:off x="5202238" y="2735263"/>
-          <a:ext cx="3532187" cy="2601912"/>
-        </p:xfrm>
-        <a:graphic>
-          <a:graphicData uri="http://schemas.openxmlformats.org/presentationml/2006/ole">
-            <mc:AlternateContent xmlns:mc="http://schemas.openxmlformats.org/markup-compatibility/2006">
-              <mc:Choice xmlns:v="urn:schemas-microsoft-com:vml" Requires="v">
-                <p:oleObj spid="_x0000_s123909" name="Equation" r:id="rId4" imgW="723900" imgH="533400" progId="Equation.3">
-                  <p:embed/>
-                </p:oleObj>
-              </mc:Choice>
-              <mc:Fallback>
-                <p:oleObj name="Equation" r:id="rId4" imgW="723900" imgH="533400" progId="Equation.3">
-                  <p:embed/>
-                  <p:pic>
-                    <p:nvPicPr>
-                      <p:cNvPr id="0" name="Picture 2"/>
-                      <p:cNvPicPr>
-                        <a:picLocks noChangeAspect="1" noChangeArrowheads="1"/>
-                      </p:cNvPicPr>
-                      <p:nvPr/>
-                    </p:nvPicPr>
-                    <p:blipFill>
-                      <a:blip r:embed="rId5"/>
-                      <a:srcRect/>
-                      <a:stretch>
-                        <a:fillRect/>
-                      </a:stretch>
-                    </p:blipFill>
-                    <p:spPr bwMode="auto">
-                      <a:xfrm>
-                        <a:off x="5202238" y="2735263"/>
-                        <a:ext cx="3532187" cy="2601912"/>
-                      </a:xfrm>
-                      <a:prstGeom prst="rect">
-                        <a:avLst/>
-                      </a:prstGeom>
-                      <a:noFill/>
-                      <a:extLst>
-                        <a:ext uri="{909E8E84-426E-40dd-AFC4-6F175D3DCCD1}">
-                          <a14:hiddenFill xmlns:a14="http://schemas.microsoft.com/office/drawing/2010/main">
-                            <a:solidFill>
-                              <a:srgbClr val="FFFFFF"/>
-                            </a:solidFill>
-                          </a14:hiddenFill>
-                        </a:ext>
-                      </a:extLst>
-                    </p:spPr>
-                  </p:pic>
-                </p:oleObj>
-              </mc:Fallback>
-            </mc:AlternateContent>
-          </a:graphicData>
-        </a:graphic>
-      </p:graphicFrame>
-      <p:graphicFrame>
-        <p:nvGraphicFramePr>
-          <p:cNvPr id="113669" name="Object 6"/>
-          <p:cNvGraphicFramePr>
-            <a:graphicFrameLocks noChangeAspect="1"/>
-          </p:cNvGraphicFramePr>
-          <p:nvPr>
-            <p:extLst>
-              <p:ext uri="{D42A27DB-BD31-4B8C-83A1-F6EECF244321}">
-                <p14:modId xmlns:p14="http://schemas.microsoft.com/office/powerpoint/2010/main" val="380663491"/>
-              </p:ext>
-            </p:extLst>
-          </p:nvPr>
-        </p:nvGraphicFramePr>
-        <p:xfrm>
-          <a:off x="473075" y="2862263"/>
-          <a:ext cx="4872038" cy="2409825"/>
-        </p:xfrm>
-        <a:graphic>
-          <a:graphicData uri="http://schemas.openxmlformats.org/presentationml/2006/ole">
-            <mc:AlternateContent xmlns:mc="http://schemas.openxmlformats.org/markup-compatibility/2006">
-              <mc:Choice xmlns:v="urn:schemas-microsoft-com:vml" Requires="v">
-                <p:oleObj spid="_x0000_s123910" name="Equation" r:id="rId6" imgW="1130300" imgH="558800" progId="Equation.3">
-                  <p:embed/>
-                </p:oleObj>
-              </mc:Choice>
-              <mc:Fallback>
-                <p:oleObj name="Equation" r:id="rId6" imgW="1130300" imgH="558800" progId="Equation.3">
-                  <p:embed/>
-                  <p:pic>
-                    <p:nvPicPr>
-                      <p:cNvPr id="0" name="Object 6"/>
-                      <p:cNvPicPr>
-                        <a:picLocks noChangeAspect="1" noChangeArrowheads="1"/>
-                      </p:cNvPicPr>
-                      <p:nvPr/>
-                    </p:nvPicPr>
-                    <p:blipFill>
-                      <a:blip r:embed="rId7"/>
-                      <a:srcRect/>
-                      <a:stretch>
-                        <a:fillRect/>
-                      </a:stretch>
-                    </p:blipFill>
-                    <p:spPr bwMode="auto">
-                      <a:xfrm>
-                        <a:off x="473075" y="2862263"/>
-                        <a:ext cx="4872038" cy="2409825"/>
-                      </a:xfrm>
-                      <a:prstGeom prst="rect">
-                        <a:avLst/>
-                      </a:prstGeom>
-                      <a:noFill/>
-                      <a:extLst>
-                        <a:ext uri="{909E8E84-426E-40dd-AFC4-6F175D3DCCD1}">
-                          <a14:hiddenFill xmlns:a14="http://schemas.microsoft.com/office/drawing/2010/main">
-                            <a:solidFill>
-                              <a:srgbClr val="FFFFFF"/>
-                            </a:solidFill>
-                          </a14:hiddenFill>
-                        </a:ext>
-                      </a:extLst>
-                    </p:spPr>
-                  </p:pic>
-                </p:oleObj>
-              </mc:Fallback>
-            </mc:AlternateContent>
-          </a:graphicData>
-        </a:graphic>
-      </p:graphicFrame>
-      <p:sp>
-        <p:nvSpPr>
-          <p:cNvPr id="11" name="TextBox 10"/>
-          <p:cNvSpPr txBox="1"/>
-          <p:nvPr/>
-        </p:nvSpPr>
-        <p:spPr>
-          <a:xfrm>
-            <a:off x="1219200" y="5334000"/>
-            <a:ext cx="6792244" cy="830997"/>
-          </a:xfrm>
-          <a:prstGeom prst="rect">
-            <a:avLst/>
-          </a:prstGeom>
-          <a:noFill/>
-        </p:spPr>
-        <p:txBody>
-          <a:bodyPr wrap="none" rtlCol="0">
-            <a:spAutoFit/>
-          </a:bodyPr>
-          <a:lstStyle/>
-          <a:p>
-            <a:r>
-              <a:rPr lang="en-US" sz="4800" dirty="0" smtClean="0">
-                <a:solidFill>
-                  <a:srgbClr val="FF00FF"/>
-                </a:solidFill>
-                <a:latin typeface="Comic Sans MS" pitchFamily="66" charset="0"/>
-              </a:rPr>
-              <a:t>multinomial coefficient</a:t>
-            </a:r>
-          </a:p>
-        </p:txBody>
-      </p:sp>
-      <p:sp>
-        <p:nvSpPr>
-          <p:cNvPr id="12" name="Rectangle 11"/>
-          <p:cNvSpPr/>
-          <p:nvPr/>
-        </p:nvSpPr>
-        <p:spPr bwMode="auto">
-          <a:xfrm>
-            <a:off x="228600" y="1219200"/>
-            <a:ext cx="8686800" cy="4114800"/>
-          </a:xfrm>
-          <a:prstGeom prst="rect">
-            <a:avLst/>
-          </a:prstGeom>
-          <a:noFill/>
-          <a:ln w="38100" cap="flat" cmpd="sng" algn="ctr">
-            <a:solidFill>
-              <a:srgbClr val="FF00FF"/>
-            </a:solidFill>
-            <a:prstDash val="sysDash"/>
-            <a:round/>
-            <a:headEnd type="none" w="med" len="med"/>
-            <a:tailEnd type="none" w="med" len="med"/>
-          </a:ln>
-          <a:effectLst/>
-        </p:spPr>
-        <p:txBody>
-          <a:bodyPr vert="horz" wrap="square" lIns="91440" tIns="45720" rIns="91440" bIns="45720" numCol="1" rtlCol="0" anchor="t" anchorCtr="0" compatLnSpc="1">
-            <a:prstTxWarp prst="textNoShape">
-              <a:avLst/>
-            </a:prstTxWarp>
-          </a:bodyPr>
-          <a:lstStyle/>
-          <a:p>
-            <a:pPr marL="0" marR="0" indent="0" algn="l" defTabSz="914400" rtl="0" eaLnBrk="1" fontAlgn="base" latinLnBrk="0" hangingPunct="1">
-              <a:lnSpc>
-                <a:spcPct val="100000"/>
-              </a:lnSpc>
-              <a:spcBef>
-                <a:spcPct val="0"/>
-              </a:spcBef>
-              <a:spcAft>
-                <a:spcPct val="0"/>
-              </a:spcAft>
-              <a:buClrTx/>
-              <a:buSzTx/>
-              <a:buFontTx/>
-              <a:buNone/>
-              <a:tabLst/>
-            </a:pPr>
-            <a:endParaRPr kumimoji="0" lang="en-US" sz="3600" b="0" i="0" u="none" strike="noStrike" cap="none" normalizeH="0" baseline="0" smtClean="0">
-              <a:ln>
-                <a:noFill/>
-              </a:ln>
-              <a:solidFill>
-                <a:schemeClr val="tx1"/>
-              </a:solidFill>
-              <a:effectLst/>
-              <a:latin typeface="Times New Roman" pitchFamily="8" charset="0"/>
-            </a:endParaRPr>
-          </a:p>
-        </p:txBody>
-      </p:sp>
-    </p:spTree>
-  </p:cSld>
-  <p:clrMapOvr>
-    <a:masterClrMapping/>
-  </p:clrMapOvr>
-  <p:transition xmlns:p14="http://schemas.microsoft.com/office/powerpoint/2010/main" spd="slow">
-    <p:fade/>
-  </p:transition>
-  <p:timing>
-    <p:tnLst>
-      <p:par>
-        <p:cTn xmlns:p14="http://schemas.microsoft.com/office/powerpoint/2010/main" id="1" dur="indefinite" restart="never" nodeType="tmRoot">
-          <p:childTnLst>
-            <p:seq concurrent="1" nextAc="seek">
-              <p:cTn id="2" dur="indefinite" nodeType="mainSeq">
-                <p:childTnLst>
-                  <p:par>
-                    <p:cTn id="3" fill="hold">
-                      <p:stCondLst>
-                        <p:cond delay="indefinite"/>
-                      </p:stCondLst>
-                      <p:childTnLst>
-                        <p:par>
-                          <p:cTn id="4" fill="hold">
-                            <p:stCondLst>
-                              <p:cond delay="0"/>
-                            </p:stCondLst>
-                            <p:childTnLst>
-                              <p:par>
-                                <p:cTn id="5" presetID="22" presetClass="entr" presetSubtype="8" fill="hold" nodeType="clickEffect">
-                                  <p:stCondLst>
-                                    <p:cond delay="0"/>
-                                  </p:stCondLst>
-                                  <p:childTnLst>
-                                    <p:set>
-                                      <p:cBhvr>
-                                        <p:cTn id="6" dur="1" fill="hold">
-                                          <p:stCondLst>
-                                            <p:cond delay="0"/>
-                                          </p:stCondLst>
-                                        </p:cTn>
-                                        <p:tgtEl>
-                                          <p:spTgt spid="7"/>
-                                        </p:tgtEl>
-                                        <p:attrNameLst>
-                                          <p:attrName>style.visibility</p:attrName>
-                                        </p:attrNameLst>
-                                      </p:cBhvr>
-                                      <p:to>
-                                        <p:strVal val="visible"/>
-                                      </p:to>
-                                    </p:set>
-                                    <p:animEffect transition="in" filter="wipe(left)">
-                                      <p:cBhvr>
-                                        <p:cTn id="7" dur="500"/>
-                                        <p:tgtEl>
-                                          <p:spTgt spid="7"/>
-                                        </p:tgtEl>
-                                      </p:cBhvr>
-                                    </p:animEffect>
-                                  </p:childTnLst>
-                                </p:cTn>
-                              </p:par>
-                            </p:childTnLst>
-                          </p:cTn>
-                        </p:par>
-                      </p:childTnLst>
-                    </p:cTn>
-                  </p:par>
-                  <p:par>
-                    <p:cTn id="8" fill="hold">
-                      <p:stCondLst>
-                        <p:cond delay="indefinite"/>
-                      </p:stCondLst>
-                      <p:childTnLst>
-                        <p:par>
-                          <p:cTn id="9" fill="hold">
-                            <p:stCondLst>
-                              <p:cond delay="0"/>
-                            </p:stCondLst>
-                            <p:childTnLst>
-                              <p:par>
-                                <p:cTn id="10" presetID="15" presetClass="entr" presetSubtype="0" fill="hold" nodeType="clickEffect">
-                                  <p:stCondLst>
-                                    <p:cond delay="0"/>
-                                  </p:stCondLst>
-                                  <p:childTnLst>
-                                    <p:set>
-                                      <p:cBhvr>
-                                        <p:cTn id="11" dur="1" fill="hold">
-                                          <p:stCondLst>
-                                            <p:cond delay="0"/>
-                                          </p:stCondLst>
-                                        </p:cTn>
-                                        <p:tgtEl>
-                                          <p:spTgt spid="113669"/>
-                                        </p:tgtEl>
-                                        <p:attrNameLst>
-                                          <p:attrName>style.visibility</p:attrName>
-                                        </p:attrNameLst>
-                                      </p:cBhvr>
-                                      <p:to>
-                                        <p:strVal val="visible"/>
-                                      </p:to>
-                                    </p:set>
-                                    <p:anim calcmode="lin" valueType="num">
-                                      <p:cBhvr>
-                                        <p:cTn id="12" dur="1000" fill="hold"/>
-                                        <p:tgtEl>
-                                          <p:spTgt spid="113669"/>
-                                        </p:tgtEl>
-                                        <p:attrNameLst>
-                                          <p:attrName>ppt_w</p:attrName>
-                                        </p:attrNameLst>
-                                      </p:cBhvr>
-                                      <p:tavLst>
-                                        <p:tav tm="0">
-                                          <p:val>
-                                            <p:fltVal val="0"/>
-                                          </p:val>
-                                        </p:tav>
-                                        <p:tav tm="100000">
-                                          <p:val>
-                                            <p:strVal val="#ppt_w"/>
-                                          </p:val>
-                                        </p:tav>
-                                      </p:tavLst>
-                                    </p:anim>
-                                    <p:anim calcmode="lin" valueType="num">
-                                      <p:cBhvr>
-                                        <p:cTn id="13" dur="1000" fill="hold"/>
-                                        <p:tgtEl>
-                                          <p:spTgt spid="113669"/>
-                                        </p:tgtEl>
-                                        <p:attrNameLst>
-                                          <p:attrName>ppt_h</p:attrName>
-                                        </p:attrNameLst>
-                                      </p:cBhvr>
-                                      <p:tavLst>
-                                        <p:tav tm="0">
-                                          <p:val>
-                                            <p:fltVal val="0"/>
-                                          </p:val>
-                                        </p:tav>
-                                        <p:tav tm="100000">
-                                          <p:val>
-                                            <p:strVal val="#ppt_h"/>
-                                          </p:val>
-                                        </p:tav>
-                                      </p:tavLst>
-                                    </p:anim>
-                                    <p:anim calcmode="lin" valueType="num">
-                                      <p:cBhvr>
-                                        <p:cTn id="14" dur="1000" fill="hold"/>
-                                        <p:tgtEl>
-                                          <p:spTgt spid="113669"/>
-                                        </p:tgtEl>
-                                        <p:attrNameLst>
-                                          <p:attrName>ppt_x</p:attrName>
-                                        </p:attrNameLst>
-                                      </p:cBhvr>
-                                      <p:tavLst>
-                                        <p:tav tm="0" fmla="#ppt_x+(cos(-2*pi*(1-$))*-#ppt_x-sin(-2*pi*(1-$))*(1-#ppt_y))*(1-$)">
-                                          <p:val>
-                                            <p:fltVal val="0"/>
-                                          </p:val>
-                                        </p:tav>
-                                        <p:tav tm="100000">
-                                          <p:val>
-                                            <p:fltVal val="1"/>
-                                          </p:val>
-                                        </p:tav>
-                                      </p:tavLst>
-                                    </p:anim>
-                                    <p:anim calcmode="lin" valueType="num">
-                                      <p:cBhvr>
-                                        <p:cTn id="15" dur="1000" fill="hold"/>
-                                        <p:tgtEl>
-                                          <p:spTgt spid="113669"/>
-                                        </p:tgtEl>
-                                        <p:attrNameLst>
-                                          <p:attrName>ppt_y</p:attrName>
-                                        </p:attrNameLst>
-                                      </p:cBhvr>
-                                      <p:tavLst>
-                                        <p:tav tm="0" fmla="#ppt_y+(sin(-2*pi*(1-$))*-#ppt_x+cos(-2*pi*(1-$))*(1-#ppt_y))*(1-$)">
-                                          <p:val>
-                                            <p:fltVal val="0"/>
-                                          </p:val>
-                                        </p:tav>
-                                        <p:tav tm="100000">
-                                          <p:val>
-                                            <p:fltVal val="1"/>
-                                          </p:val>
-                                        </p:tav>
-                                      </p:tavLst>
-                                    </p:anim>
-                                  </p:childTnLst>
-                                </p:cTn>
-                              </p:par>
-                            </p:childTnLst>
-                          </p:cTn>
-                        </p:par>
-                        <p:par>
-                          <p:cTn id="16" fill="hold">
-                            <p:stCondLst>
-                              <p:cond delay="1000"/>
-                            </p:stCondLst>
-                            <p:childTnLst>
-                              <p:par>
-                                <p:cTn id="17" presetID="9" presetClass="entr" presetSubtype="0" fill="hold" grpId="0" nodeType="afterEffect">
-                                  <p:stCondLst>
-                                    <p:cond delay="0"/>
-                                  </p:stCondLst>
-                                  <p:childTnLst>
-                                    <p:set>
-                                      <p:cBhvr>
-                                        <p:cTn id="18" dur="1" fill="hold">
-                                          <p:stCondLst>
-                                            <p:cond delay="0"/>
-                                          </p:stCondLst>
-                                        </p:cTn>
-                                        <p:tgtEl>
-                                          <p:spTgt spid="11"/>
-                                        </p:tgtEl>
-                                        <p:attrNameLst>
-                                          <p:attrName>style.visibility</p:attrName>
-                                        </p:attrNameLst>
-                                      </p:cBhvr>
-                                      <p:to>
-                                        <p:strVal val="visible"/>
-                                      </p:to>
-                                    </p:set>
-                                    <p:animEffect transition="in" filter="dissolve">
-                                      <p:cBhvr>
-                                        <p:cTn id="19" dur="500"/>
-                                        <p:tgtEl>
-                                          <p:spTgt spid="11"/>
-                                        </p:tgtEl>
-                                      </p:cBhvr>
-                                    </p:animEffect>
-                                  </p:childTnLst>
-                                </p:cTn>
-                              </p:par>
-                            </p:childTnLst>
-                          </p:cTn>
-                        </p:par>
-                        <p:par>
-                          <p:cTn id="20" fill="hold">
-                            <p:stCondLst>
-                              <p:cond delay="1500"/>
-                            </p:stCondLst>
-                            <p:childTnLst>
-                              <p:par>
-                                <p:cTn id="21" presetID="9" presetClass="entr" presetSubtype="0" fill="hold" grpId="0" nodeType="afterEffect">
-                                  <p:stCondLst>
-                                    <p:cond delay="500"/>
-                                  </p:stCondLst>
-                                  <p:childTnLst>
-                                    <p:set>
-                                      <p:cBhvr>
-                                        <p:cTn id="22" dur="1" fill="hold">
-                                          <p:stCondLst>
-                                            <p:cond delay="0"/>
-                                          </p:stCondLst>
-                                        </p:cTn>
-                                        <p:tgtEl>
-                                          <p:spTgt spid="12"/>
-                                        </p:tgtEl>
-                                        <p:attrNameLst>
-                                          <p:attrName>style.visibility</p:attrName>
-                                        </p:attrNameLst>
-                                      </p:cBhvr>
-                                      <p:to>
-                                        <p:strVal val="visible"/>
-                                      </p:to>
-                                    </p:set>
-                                    <p:animEffect transition="in" filter="dissolve">
-                                      <p:cBhvr>
-                                        <p:cTn id="23" dur="500"/>
-                                        <p:tgtEl>
-                                          <p:spTgt spid="12"/>
-                                        </p:tgtEl>
-                                      </p:cBhvr>
-                                    </p:animEffect>
-                                  </p:childTnLst>
-                                </p:cTn>
-                              </p:par>
-                            </p:childTnLst>
-                          </p:cTn>
-                        </p:par>
-                      </p:childTnLst>
-                    </p:cTn>
-                  </p:par>
-                </p:childTnLst>
-              </p:cTn>
-              <p:prevCondLst>
-                <p:cond evt="onPrev" delay="0">
-                  <p:tgtEl>
-                    <p:sldTgt/>
-                  </p:tgtEl>
-                </p:cond>
-              </p:prevCondLst>
-              <p:nextCondLst>
-                <p:cond evt="onNext" delay="0">
-                  <p:tgtEl>
-                    <p:sldTgt/>
-                  </p:tgtEl>
-                </p:cond>
-              </p:nextCondLst>
-            </p:seq>
-          </p:childTnLst>
-        </p:cTn>
-      </p:par>
-    </p:tnLst>
-    <p:bldLst>
-      <p:bldP spid="11" grpId="0"/>
-      <p:bldP spid="12" grpId="0" animBg="1"/>
-    </p:bldLst>
-  </p:timing>
-</p:sld>
-</file>
-
-<file path=ppt/slides/slide6.xml><?xml version="1.0" encoding="utf-8"?>
 <p:sld xmlns:a="http://schemas.openxmlformats.org/drawingml/2006/main" xmlns:r="http://schemas.openxmlformats.org/officeDocument/2006/relationships" xmlns:p="http://schemas.openxmlformats.org/presentationml/2006/main">
   <p:cSld>
     <p:spTree>
@@ -12268,16 +10953,12 @@
             </a:r>
             <a:r>
               <a:rPr lang="en-US" dirty="0" smtClean="0"/>
-              <a:t> </a:t>
-            </a:r>
-            <a:r>
-              <a:rPr lang="en-US" dirty="0" smtClean="0"/>
-              <a:t>11W.</a:t>
+              <a:t> 11W.</a:t>
             </a:r>
             <a:fld id="{845CA0E0-B8FA-42CB-A503-BCBE39D9C5FE}" type="slidenum">
               <a:rPr lang="en-US" smtClean="0"/>
               <a:pPr/>
-              <a:t>6</a:t>
+              <a:t>5</a:t>
             </a:fld>
             <a:endParaRPr lang="en-US" dirty="0"/>
           </a:p>
@@ -13326,7 +12007,7 @@
 </p:sld>
 </file>
 
-<file path=ppt/slides/slide7.xml><?xml version="1.0" encoding="utf-8"?>
+<file path=ppt/slides/slide6.xml><?xml version="1.0" encoding="utf-8"?>
 <p:sld xmlns:a="http://schemas.openxmlformats.org/drawingml/2006/main" xmlns:r="http://schemas.openxmlformats.org/officeDocument/2006/relationships" xmlns:p="http://schemas.openxmlformats.org/presentationml/2006/main">
   <p:cSld>
     <p:spTree>
@@ -13364,16 +12045,12 @@
             </a:r>
             <a:r>
               <a:rPr lang="en-US" dirty="0" smtClean="0"/>
-              <a:t> </a:t>
-            </a:r>
-            <a:r>
-              <a:rPr lang="en-US" dirty="0" smtClean="0"/>
-              <a:t>11W.</a:t>
+              <a:t> 11W.</a:t>
             </a:r>
             <a:fld id="{64FB21FE-007D-46D2-81F9-0E7997E4EF8F}" type="slidenum">
               <a:rPr lang="en-US" smtClean="0"/>
               <a:pPr/>
-              <a:t>7</a:t>
+              <a:t>6</a:t>
             </a:fld>
             <a:endParaRPr lang="en-US" dirty="0"/>
           </a:p>
@@ -14108,7 +12785,7 @@
 </p:sld>
 </file>
 
-<file path=ppt/slides/slide8.xml><?xml version="1.0" encoding="utf-8"?>
+<file path=ppt/slides/slide7.xml><?xml version="1.0" encoding="utf-8"?>
 <p:sld xmlns:a="http://schemas.openxmlformats.org/drawingml/2006/main" xmlns:r="http://schemas.openxmlformats.org/officeDocument/2006/relationships" xmlns:p="http://schemas.openxmlformats.org/presentationml/2006/main">
   <p:cSld>
     <p:spTree>
@@ -14146,16 +12823,12 @@
             </a:r>
             <a:r>
               <a:rPr lang="en-US" dirty="0" smtClean="0"/>
-              <a:t> </a:t>
-            </a:r>
-            <a:r>
-              <a:rPr lang="en-US" dirty="0" smtClean="0"/>
-              <a:t>11W.</a:t>
+              <a:t> 11W.</a:t>
             </a:r>
             <a:fld id="{617C8E69-851E-4C8D-9C42-AE5C16D8F86B}" type="slidenum">
               <a:rPr lang="en-US" smtClean="0"/>
               <a:pPr/>
-              <a:t>8</a:t>
+              <a:t>7</a:t>
             </a:fld>
             <a:endParaRPr lang="en-US" dirty="0"/>
           </a:p>
@@ -14916,7 +13589,7 @@
 </p:sld>
 </file>
 
-<file path=ppt/slides/slide9.xml><?xml version="1.0" encoding="utf-8"?>
+<file path=ppt/slides/slide8.xml><?xml version="1.0" encoding="utf-8"?>
 <p:sld xmlns:a="http://schemas.openxmlformats.org/drawingml/2006/main" xmlns:r="http://schemas.openxmlformats.org/officeDocument/2006/relationships" xmlns:p="http://schemas.openxmlformats.org/presentationml/2006/main" show="0">
   <p:cSld>
     <p:spTree>
@@ -14954,16 +13627,12 @@
             </a:r>
             <a:r>
               <a:rPr lang="en-US" dirty="0" smtClean="0"/>
-              <a:t> </a:t>
-            </a:r>
-            <a:r>
-              <a:rPr lang="en-US" dirty="0" smtClean="0"/>
-              <a:t>11W.</a:t>
+              <a:t> 11W.</a:t>
             </a:r>
             <a:fld id="{617C8E69-851E-4C8D-9C42-AE5C16D8F86B}" type="slidenum">
               <a:rPr lang="en-US" smtClean="0"/>
               <a:pPr/>
-              <a:t>9</a:t>
+              <a:t>8</a:t>
             </a:fld>
             <a:endParaRPr lang="en-US" dirty="0"/>
           </a:p>
@@ -15341,6 +14010,335 @@
     <p:tnLst>
       <p:par>
         <p:cTn xmlns:p14="http://schemas.microsoft.com/office/powerpoint/2010/main" id="1" dur="indefinite" restart="never" nodeType="tmRoot"/>
+      </p:par>
+    </p:tnLst>
+  </p:timing>
+</p:sld>
+</file>
+
+<file path=ppt/slides/slide9.xml><?xml version="1.0" encoding="utf-8"?>
+<p:sld xmlns:a="http://schemas.openxmlformats.org/drawingml/2006/main" xmlns:r="http://schemas.openxmlformats.org/officeDocument/2006/relationships" xmlns:p="http://schemas.openxmlformats.org/presentationml/2006/main">
+  <p:cSld>
+    <p:spTree>
+      <p:nvGrpSpPr>
+        <p:cNvPr id="1" name=""/>
+        <p:cNvGrpSpPr/>
+        <p:nvPr/>
+      </p:nvGrpSpPr>
+      <p:grpSpPr>
+        <a:xfrm>
+          <a:off x="0" y="0"/>
+          <a:ext cx="0" cy="0"/>
+          <a:chOff x="0" y="0"/>
+          <a:chExt cx="0" cy="0"/>
+        </a:xfrm>
+      </p:grpSpPr>
+      <p:sp>
+        <p:nvSpPr>
+          <p:cNvPr id="5" name="Slide Number Placeholder 3"/>
+          <p:cNvSpPr>
+            <a:spLocks noGrp="1"/>
+          </p:cNvSpPr>
+          <p:nvPr>
+            <p:ph type="sldNum" sz="quarter" idx="10"/>
+          </p:nvPr>
+        </p:nvSpPr>
+        <p:spPr/>
+        <p:txBody>
+          <a:bodyPr/>
+          <a:lstStyle/>
+          <a:p>
+            <a:r>
+              <a:rPr lang="en-US" dirty="0" err="1" smtClean="0"/>
+              <a:t>lec</a:t>
+            </a:r>
+            <a:r>
+              <a:rPr lang="en-US" dirty="0" smtClean="0"/>
+              <a:t> 11W.</a:t>
+            </a:r>
+            <a:fld id="{FFB56D1A-619E-4CBF-8825-888C645FEF12}" type="slidenum">
+              <a:rPr lang="en-US" smtClean="0"/>
+              <a:pPr/>
+              <a:t>9</a:t>
+            </a:fld>
+            <a:endParaRPr lang="en-US" dirty="0"/>
+          </a:p>
+        </p:txBody>
+      </p:sp>
+      <p:sp>
+        <p:nvSpPr>
+          <p:cNvPr id="371714" name="Rectangle 2"/>
+          <p:cNvSpPr>
+            <a:spLocks noGrp="1" noChangeArrowheads="1"/>
+          </p:cNvSpPr>
+          <p:nvPr>
+            <p:ph type="title"/>
+          </p:nvPr>
+        </p:nvSpPr>
+        <p:spPr/>
+        <p:txBody>
+          <a:bodyPr/>
+          <a:lstStyle/>
+          <a:p>
+            <a:r>
+              <a:rPr lang="en-US" sz="4400" i="1" dirty="0" smtClean="0"/>
+              <a:t>example</a:t>
+            </a:r>
+            <a:r>
+              <a:rPr lang="en-US" sz="4400" i="1" dirty="0"/>
+              <a:t>: </a:t>
+            </a:r>
+            <a:r>
+              <a:rPr lang="en-US" sz="4800" dirty="0"/>
+              <a:t>5 Card Draw</a:t>
+            </a:r>
+          </a:p>
+        </p:txBody>
+      </p:sp>
+      <p:sp>
+        <p:nvSpPr>
+          <p:cNvPr id="371715" name="Rectangle 3"/>
+          <p:cNvSpPr>
+            <a:spLocks noGrp="1" noChangeArrowheads="1"/>
+          </p:cNvSpPr>
+          <p:nvPr>
+            <p:ph type="body" idx="1"/>
+          </p:nvPr>
+        </p:nvSpPr>
+        <p:spPr>
+          <a:xfrm>
+            <a:off x="393700" y="2209800"/>
+            <a:ext cx="7226300" cy="3352800"/>
+          </a:xfrm>
+        </p:spPr>
+        <p:txBody>
+          <a:bodyPr/>
+          <a:lstStyle/>
+          <a:p>
+            <a:pPr>
+              <a:buFontTx/>
+              <a:buNone/>
+            </a:pPr>
+            <a:r>
+              <a:rPr lang="en-US" sz="5400" dirty="0" smtClean="0"/>
+              <a:t>set </a:t>
+            </a:r>
+            <a:r>
+              <a:rPr lang="en-US" sz="5400" dirty="0"/>
+              <a:t>of 5 cards:</a:t>
+            </a:r>
+          </a:p>
+          <a:p>
+            <a:pPr>
+              <a:buFontTx/>
+              <a:buNone/>
+            </a:pPr>
+            <a:r>
+              <a:rPr lang="en-US" sz="5400" dirty="0"/>
+              <a:t>must have</a:t>
+            </a:r>
+            <a:r>
+              <a:rPr lang="en-US" sz="5400" dirty="0" smtClean="0"/>
+              <a:t> </a:t>
+            </a:r>
+            <a:r>
+              <a:rPr lang="en-US" sz="5400" b="1" dirty="0" smtClean="0">
+                <a:solidFill>
+                  <a:srgbClr val="008000"/>
+                </a:solidFill>
+                <a:latin typeface="Euclid Symbol" charset="2"/>
+                <a:cs typeface="Euclid Symbol" charset="2"/>
+                <a:sym typeface="Symbol"/>
+              </a:rPr>
+              <a:t>≥</a:t>
+            </a:r>
+            <a:r>
+              <a:rPr lang="en-US" sz="5400" b="1" dirty="0" smtClean="0">
+                <a:solidFill>
+                  <a:srgbClr val="00B050"/>
+                </a:solidFill>
+                <a:latin typeface="cmsy10" pitchFamily="34" charset="0"/>
+                <a:sym typeface="Symbol"/>
+              </a:rPr>
+              <a:t> </a:t>
+            </a:r>
+            <a:r>
+              <a:rPr lang="en-US" sz="5400" dirty="0" smtClean="0">
+                <a:solidFill>
+                  <a:srgbClr val="00B050"/>
+                </a:solidFill>
+              </a:rPr>
+              <a:t>2</a:t>
+            </a:r>
+            <a:endParaRPr lang="en-US" sz="5400" dirty="0">
+              <a:solidFill>
+                <a:srgbClr val="00B050"/>
+              </a:solidFill>
+            </a:endParaRPr>
+          </a:p>
+          <a:p>
+            <a:pPr>
+              <a:buFontTx/>
+              <a:buNone/>
+            </a:pPr>
+            <a:r>
+              <a:rPr lang="en-US" sz="5400" dirty="0"/>
+              <a:t>with the </a:t>
+            </a:r>
+            <a:r>
+              <a:rPr lang="en-US" sz="6000" dirty="0">
+                <a:solidFill>
+                  <a:srgbClr val="3333CC"/>
+                </a:solidFill>
+              </a:rPr>
+              <a:t>same suit</a:t>
+            </a:r>
+            <a:r>
+              <a:rPr lang="en-US" sz="6000" dirty="0"/>
+              <a:t>.</a:t>
+            </a:r>
+          </a:p>
+        </p:txBody>
+      </p:sp>
+      <p:pic>
+        <p:nvPicPr>
+          <p:cNvPr id="371716" name="Picture 4" descr="sl12212"/>
+          <p:cNvPicPr>
+            <a:picLocks noChangeAspect="1" noChangeArrowheads="1"/>
+          </p:cNvPicPr>
+          <p:nvPr/>
+        </p:nvPicPr>
+        <p:blipFill>
+          <a:blip r:embed="rId3"/>
+          <a:srcRect/>
+          <a:stretch>
+            <a:fillRect/>
+          </a:stretch>
+        </p:blipFill>
+        <p:spPr bwMode="auto">
+          <a:xfrm>
+            <a:off x="6559550" y="1447800"/>
+            <a:ext cx="2136775" cy="2709863"/>
+          </a:xfrm>
+          <a:prstGeom prst="rect">
+            <a:avLst/>
+          </a:prstGeom>
+          <a:noFill/>
+        </p:spPr>
+      </p:pic>
+    </p:spTree>
+  </p:cSld>
+  <p:clrMapOvr>
+    <a:masterClrMapping/>
+  </p:clrMapOvr>
+  <p:transition xmlns:p14="http://schemas.microsoft.com/office/powerpoint/2010/main"/>
+  <p:timing>
+    <p:tnLst>
+      <p:par>
+        <p:cTn xmlns:p14="http://schemas.microsoft.com/office/powerpoint/2010/main" id="1" dur="indefinite" restart="never" nodeType="tmRoot">
+          <p:childTnLst>
+            <p:seq concurrent="1" nextAc="seek">
+              <p:cTn id="2" dur="indefinite" nodeType="mainSeq">
+                <p:childTnLst>
+                  <p:par>
+                    <p:cTn id="3" fill="hold">
+                      <p:stCondLst>
+                        <p:cond delay="indefinite"/>
+                      </p:stCondLst>
+                      <p:childTnLst>
+                        <p:par>
+                          <p:cTn id="4" fill="hold">
+                            <p:stCondLst>
+                              <p:cond delay="0"/>
+                            </p:stCondLst>
+                            <p:childTnLst>
+                              <p:par>
+                                <p:cTn id="5" presetID="1" presetClass="entr" presetSubtype="0" fill="hold" nodeType="clickEffect">
+                                  <p:stCondLst>
+                                    <p:cond delay="0"/>
+                                  </p:stCondLst>
+                                  <p:childTnLst>
+                                    <p:set>
+                                      <p:cBhvr>
+                                        <p:cTn id="6" dur="1" fill="hold">
+                                          <p:stCondLst>
+                                            <p:cond delay="0"/>
+                                          </p:stCondLst>
+                                        </p:cTn>
+                                        <p:tgtEl>
+                                          <p:spTgt spid="371715">
+                                            <p:txEl>
+                                              <p:pRg st="1" end="1"/>
+                                            </p:txEl>
+                                          </p:spTgt>
+                                        </p:tgtEl>
+                                        <p:attrNameLst>
+                                          <p:attrName>style.visibility</p:attrName>
+                                        </p:attrNameLst>
+                                      </p:cBhvr>
+                                      <p:to>
+                                        <p:strVal val="visible"/>
+                                      </p:to>
+                                    </p:set>
+                                  </p:childTnLst>
+                                </p:cTn>
+                              </p:par>
+                              <p:par>
+                                <p:cTn id="7" presetID="1" presetClass="entr" presetSubtype="0" fill="hold" nodeType="withEffect">
+                                  <p:stCondLst>
+                                    <p:cond delay="0"/>
+                                  </p:stCondLst>
+                                  <p:childTnLst>
+                                    <p:set>
+                                      <p:cBhvr>
+                                        <p:cTn id="8" dur="1" fill="hold">
+                                          <p:stCondLst>
+                                            <p:cond delay="0"/>
+                                          </p:stCondLst>
+                                        </p:cTn>
+                                        <p:tgtEl>
+                                          <p:spTgt spid="371715">
+                                            <p:txEl>
+                                              <p:pRg st="2" end="2"/>
+                                            </p:txEl>
+                                          </p:spTgt>
+                                        </p:tgtEl>
+                                        <p:attrNameLst>
+                                          <p:attrName>style.visibility</p:attrName>
+                                        </p:attrNameLst>
+                                      </p:cBhvr>
+                                      <p:to>
+                                        <p:strVal val="visible"/>
+                                      </p:to>
+                                    </p:set>
+                                  </p:childTnLst>
+                                </p:cTn>
+                              </p:par>
+                            </p:childTnLst>
+                          </p:cTn>
+                        </p:par>
+                      </p:childTnLst>
+                    </p:cTn>
+                  </p:par>
+                </p:childTnLst>
+              </p:cTn>
+              <p:prevCondLst>
+                <p:cond evt="onPrev" delay="0">
+                  <p:tgtEl>
+                    <p:sldTgt/>
+                  </p:tgtEl>
+                </p:cond>
+              </p:prevCondLst>
+              <p:nextCondLst>
+                <p:cond evt="onNext" delay="0">
+                  <p:tgtEl>
+                    <p:sldTgt/>
+                  </p:tgtEl>
+                </p:cond>
+              </p:nextCondLst>
+            </p:seq>
+          </p:childTnLst>
+        </p:cTn>
       </p:par>
     </p:tnLst>
   </p:timing>

</xml_diff>